<commit_message>
Ajout d'espace pour ecrire
</commit_message>
<xml_diff>
--- a/src/bims_tour_coup.pptx
+++ b/src/bims_tour_coup.pptx
@@ -243,7 +243,7 @@
           <a:p>
             <a:fld id="{666437CF-6810-4A08-BF63-137A709DEE82}" type="datetimeFigureOut">
               <a:rPr lang="fr-FR" smtClean="0"/>
-              <a:t>16/12/2024</a:t>
+              <a:t>17/12/2024</a:t>
             </a:fld>
             <a:endParaRPr lang="fr-FR" dirty="0"/>
           </a:p>
@@ -413,7 +413,7 @@
           <a:p>
             <a:fld id="{666437CF-6810-4A08-BF63-137A709DEE82}" type="datetimeFigureOut">
               <a:rPr lang="fr-FR" smtClean="0"/>
-              <a:t>16/12/2024</a:t>
+              <a:t>17/12/2024</a:t>
             </a:fld>
             <a:endParaRPr lang="fr-FR" dirty="0"/>
           </a:p>
@@ -593,7 +593,7 @@
           <a:p>
             <a:fld id="{666437CF-6810-4A08-BF63-137A709DEE82}" type="datetimeFigureOut">
               <a:rPr lang="fr-FR" smtClean="0"/>
-              <a:t>16/12/2024</a:t>
+              <a:t>17/12/2024</a:t>
             </a:fld>
             <a:endParaRPr lang="fr-FR" dirty="0"/>
           </a:p>
@@ -763,7 +763,7 @@
           <a:p>
             <a:fld id="{666437CF-6810-4A08-BF63-137A709DEE82}" type="datetimeFigureOut">
               <a:rPr lang="fr-FR" smtClean="0"/>
-              <a:t>16/12/2024</a:t>
+              <a:t>17/12/2024</a:t>
             </a:fld>
             <a:endParaRPr lang="fr-FR" dirty="0"/>
           </a:p>
@@ -1007,7 +1007,7 @@
           <a:p>
             <a:fld id="{666437CF-6810-4A08-BF63-137A709DEE82}" type="datetimeFigureOut">
               <a:rPr lang="fr-FR" smtClean="0"/>
-              <a:t>16/12/2024</a:t>
+              <a:t>17/12/2024</a:t>
             </a:fld>
             <a:endParaRPr lang="fr-FR" dirty="0"/>
           </a:p>
@@ -1239,7 +1239,7 @@
           <a:p>
             <a:fld id="{666437CF-6810-4A08-BF63-137A709DEE82}" type="datetimeFigureOut">
               <a:rPr lang="fr-FR" smtClean="0"/>
-              <a:t>16/12/2024</a:t>
+              <a:t>17/12/2024</a:t>
             </a:fld>
             <a:endParaRPr lang="fr-FR" dirty="0"/>
           </a:p>
@@ -1606,7 +1606,7 @@
           <a:p>
             <a:fld id="{666437CF-6810-4A08-BF63-137A709DEE82}" type="datetimeFigureOut">
               <a:rPr lang="fr-FR" smtClean="0"/>
-              <a:t>16/12/2024</a:t>
+              <a:t>17/12/2024</a:t>
             </a:fld>
             <a:endParaRPr lang="fr-FR" dirty="0"/>
           </a:p>
@@ -1724,7 +1724,7 @@
           <a:p>
             <a:fld id="{666437CF-6810-4A08-BF63-137A709DEE82}" type="datetimeFigureOut">
               <a:rPr lang="fr-FR" smtClean="0"/>
-              <a:t>16/12/2024</a:t>
+              <a:t>17/12/2024</a:t>
             </a:fld>
             <a:endParaRPr lang="fr-FR" dirty="0"/>
           </a:p>
@@ -1819,7 +1819,7 @@
           <a:p>
             <a:fld id="{666437CF-6810-4A08-BF63-137A709DEE82}" type="datetimeFigureOut">
               <a:rPr lang="fr-FR" smtClean="0"/>
-              <a:t>16/12/2024</a:t>
+              <a:t>17/12/2024</a:t>
             </a:fld>
             <a:endParaRPr lang="fr-FR" dirty="0"/>
           </a:p>
@@ -2096,7 +2096,7 @@
           <a:p>
             <a:fld id="{666437CF-6810-4A08-BF63-137A709DEE82}" type="datetimeFigureOut">
               <a:rPr lang="fr-FR" smtClean="0"/>
-              <a:t>16/12/2024</a:t>
+              <a:t>17/12/2024</a:t>
             </a:fld>
             <a:endParaRPr lang="fr-FR" dirty="0"/>
           </a:p>
@@ -2353,7 +2353,7 @@
           <a:p>
             <a:fld id="{666437CF-6810-4A08-BF63-137A709DEE82}" type="datetimeFigureOut">
               <a:rPr lang="fr-FR" smtClean="0"/>
-              <a:t>16/12/2024</a:t>
+              <a:t>17/12/2024</a:t>
             </a:fld>
             <a:endParaRPr lang="fr-FR" dirty="0"/>
           </a:p>
@@ -2566,7 +2566,7 @@
           <a:p>
             <a:fld id="{666437CF-6810-4A08-BF63-137A709DEE82}" type="datetimeFigureOut">
               <a:rPr lang="fr-FR" smtClean="0"/>
-              <a:t>16/12/2024</a:t>
+              <a:t>17/12/2024</a:t>
             </a:fld>
             <a:endParaRPr lang="fr-FR" dirty="0"/>
           </a:p>
@@ -3117,8 +3117,8 @@
         </p:nvSpPr>
         <p:spPr>
           <a:xfrm rot="21237303">
-            <a:off x="458117" y="6205908"/>
-            <a:ext cx="20068571" cy="4093428"/>
+            <a:off x="1724860" y="5146245"/>
+            <a:ext cx="18798296" cy="4093428"/>
           </a:xfrm>
           <a:prstGeom prst="rect">
             <a:avLst/>
@@ -3135,7 +3135,7 @@
           </a:effectLst>
         </p:spPr>
         <p:txBody>
-          <a:bodyPr wrap="none" rtlCol="0">
+          <a:bodyPr wrap="square" rtlCol="0">
             <a:spAutoFit/>
           </a:bodyPr>
           <a:lstStyle/>
@@ -3147,7 +3147,7 @@
                 </a:solidFill>
                 <a:latin typeface="Lexend"/>
               </a:rPr>
-              <a:t>     BIMS DAY    </a:t>
+              <a:t>  BIMS DAY    </a:t>
             </a:r>
           </a:p>
         </p:txBody>
@@ -3180,7 +3180,7 @@
         </p:blipFill>
         <p:spPr>
           <a:xfrm rot="21120346">
-            <a:off x="17391725" y="561769"/>
+            <a:off x="17333116" y="236987"/>
             <a:ext cx="12181300" cy="12181300"/>
           </a:xfrm>
           <a:prstGeom prst="rect">
@@ -3209,7 +3209,7 @@
         </p:nvSpPr>
         <p:spPr>
           <a:xfrm rot="21237303">
-            <a:off x="11828861" y="10741421"/>
+            <a:off x="6916235" y="9905397"/>
             <a:ext cx="6942926" cy="4093428"/>
           </a:xfrm>
           <a:prstGeom prst="rect">
@@ -3241,6 +3241,60 @@
               </a:rPr>
               <a:t>2025</a:t>
             </a:r>
+          </a:p>
+        </p:txBody>
+      </p:sp>
+      <p:sp>
+        <p:nvSpPr>
+          <p:cNvPr id="7" name="Rectangle 6">
+            <a:extLst>
+              <a:ext uri="{FF2B5EF4-FFF2-40B4-BE49-F238E27FC236}">
+                <a16:creationId xmlns:a16="http://schemas.microsoft.com/office/drawing/2014/main" id="{C36B6AB7-5539-43B0-BE63-5A4162D02036}"/>
+              </a:ext>
+            </a:extLst>
+          </p:cNvPr>
+          <p:cNvSpPr/>
+          <p:nvPr/>
+        </p:nvSpPr>
+        <p:spPr>
+          <a:xfrm>
+            <a:off x="14656844" y="12916972"/>
+            <a:ext cx="15089432" cy="5429029"/>
+          </a:xfrm>
+          <a:prstGeom prst="rect">
+            <a:avLst/>
+          </a:prstGeom>
+          <a:solidFill>
+            <a:srgbClr val="1B7081">
+              <a:alpha val="65882"/>
+            </a:srgbClr>
+          </a:solidFill>
+          <a:effectLst>
+            <a:softEdge rad="635000"/>
+          </a:effectLst>
+        </p:spPr>
+        <p:style>
+          <a:lnRef idx="2">
+            <a:schemeClr val="accent1">
+              <a:shade val="50000"/>
+            </a:schemeClr>
+          </a:lnRef>
+          <a:fillRef idx="1">
+            <a:schemeClr val="accent1"/>
+          </a:fillRef>
+          <a:effectRef idx="0">
+            <a:schemeClr val="accent1"/>
+          </a:effectRef>
+          <a:fontRef idx="minor">
+            <a:schemeClr val="lt1"/>
+          </a:fontRef>
+        </p:style>
+        <p:txBody>
+          <a:bodyPr rtlCol="0" anchor="ctr"/>
+          <a:lstStyle/>
+          <a:p>
+            <a:pPr algn="ctr"/>
+            <a:endParaRPr lang="fr-FR"/>
           </a:p>
         </p:txBody>
       </p:sp>

</xml_diff>